<commit_message>
updated erd and mr1 presentation
</commit_message>
<xml_diff>
--- a/documents/MR1_presentation.pptx
+++ b/documents/MR1_presentation.pptx
@@ -110,6 +110,11 @@
       </a:defRPr>
     </a:lvl9pPr>
   </p:defaultTextStyle>
+  <p:extLst>
+    <p:ext uri="{EFAFB233-063F-42B5-8137-9DF3F51BA10A}">
+      <p15:sldGuideLst xmlns:p15="http://schemas.microsoft.com/office/powerpoint/2012/main"/>
+    </p:ext>
+  </p:extLst>
 </p:presentation>
 </file>
 
@@ -299,7 +304,7 @@
           <a:p>
             <a:fld id="{944C4F3D-D207-4070-86C5-DABDE1FFC9F6}" type="datetimeFigureOut">
               <a:rPr lang="de-AT" smtClean="0"/>
-              <a:t>26.04.2017</a:t>
+              <a:t>27.04.2017</a:t>
             </a:fld>
             <a:endParaRPr lang="de-AT"/>
           </a:p>
@@ -574,7 +579,7 @@
           <a:p>
             <a:fld id="{944C4F3D-D207-4070-86C5-DABDE1FFC9F6}" type="datetimeFigureOut">
               <a:rPr lang="de-AT" smtClean="0"/>
-              <a:t>26.04.2017</a:t>
+              <a:t>27.04.2017</a:t>
             </a:fld>
             <a:endParaRPr lang="de-AT"/>
           </a:p>
@@ -768,7 +773,7 @@
           <a:p>
             <a:fld id="{944C4F3D-D207-4070-86C5-DABDE1FFC9F6}" type="datetimeFigureOut">
               <a:rPr lang="de-AT" smtClean="0"/>
-              <a:t>26.04.2017</a:t>
+              <a:t>27.04.2017</a:t>
             </a:fld>
             <a:endParaRPr lang="de-AT"/>
           </a:p>
@@ -1041,7 +1046,7 @@
           <a:p>
             <a:fld id="{944C4F3D-D207-4070-86C5-DABDE1FFC9F6}" type="datetimeFigureOut">
               <a:rPr lang="de-AT" smtClean="0"/>
-              <a:t>26.04.2017</a:t>
+              <a:t>27.04.2017</a:t>
             </a:fld>
             <a:endParaRPr lang="de-AT"/>
           </a:p>
@@ -1382,7 +1387,7 @@
           <a:p>
             <a:fld id="{944C4F3D-D207-4070-86C5-DABDE1FFC9F6}" type="datetimeFigureOut">
               <a:rPr lang="de-AT" smtClean="0"/>
-              <a:t>26.04.2017</a:t>
+              <a:t>27.04.2017</a:t>
             </a:fld>
             <a:endParaRPr lang="de-AT"/>
           </a:p>
@@ -2005,7 +2010,7 @@
           <a:p>
             <a:fld id="{944C4F3D-D207-4070-86C5-DABDE1FFC9F6}" type="datetimeFigureOut">
               <a:rPr lang="de-AT" smtClean="0"/>
-              <a:t>26.04.2017</a:t>
+              <a:t>27.04.2017</a:t>
             </a:fld>
             <a:endParaRPr lang="de-AT"/>
           </a:p>
@@ -2865,7 +2870,7 @@
           <a:p>
             <a:fld id="{944C4F3D-D207-4070-86C5-DABDE1FFC9F6}" type="datetimeFigureOut">
               <a:rPr lang="de-AT" smtClean="0"/>
-              <a:t>26.04.2017</a:t>
+              <a:t>27.04.2017</a:t>
             </a:fld>
             <a:endParaRPr lang="de-AT"/>
           </a:p>
@@ -3035,7 +3040,7 @@
           <a:p>
             <a:fld id="{944C4F3D-D207-4070-86C5-DABDE1FFC9F6}" type="datetimeFigureOut">
               <a:rPr lang="de-AT" smtClean="0"/>
-              <a:t>26.04.2017</a:t>
+              <a:t>27.04.2017</a:t>
             </a:fld>
             <a:endParaRPr lang="de-AT"/>
           </a:p>
@@ -3215,7 +3220,7 @@
           <a:p>
             <a:fld id="{944C4F3D-D207-4070-86C5-DABDE1FFC9F6}" type="datetimeFigureOut">
               <a:rPr lang="de-AT" smtClean="0"/>
-              <a:t>26.04.2017</a:t>
+              <a:t>27.04.2017</a:t>
             </a:fld>
             <a:endParaRPr lang="de-AT"/>
           </a:p>
@@ -3385,7 +3390,7 @@
           <a:p>
             <a:fld id="{944C4F3D-D207-4070-86C5-DABDE1FFC9F6}" type="datetimeFigureOut">
               <a:rPr lang="de-AT" smtClean="0"/>
-              <a:t>26.04.2017</a:t>
+              <a:t>27.04.2017</a:t>
             </a:fld>
             <a:endParaRPr lang="de-AT"/>
           </a:p>
@@ -3632,7 +3637,7 @@
           <a:p>
             <a:fld id="{944C4F3D-D207-4070-86C5-DABDE1FFC9F6}" type="datetimeFigureOut">
               <a:rPr lang="de-AT" smtClean="0"/>
-              <a:t>26.04.2017</a:t>
+              <a:t>27.04.2017</a:t>
             </a:fld>
             <a:endParaRPr lang="de-AT"/>
           </a:p>
@@ -3924,7 +3929,7 @@
           <a:p>
             <a:fld id="{944C4F3D-D207-4070-86C5-DABDE1FFC9F6}" type="datetimeFigureOut">
               <a:rPr lang="de-AT" smtClean="0"/>
-              <a:t>26.04.2017</a:t>
+              <a:t>27.04.2017</a:t>
             </a:fld>
             <a:endParaRPr lang="de-AT"/>
           </a:p>
@@ -4368,7 +4373,7 @@
           <a:p>
             <a:fld id="{944C4F3D-D207-4070-86C5-DABDE1FFC9F6}" type="datetimeFigureOut">
               <a:rPr lang="de-AT" smtClean="0"/>
-              <a:t>26.04.2017</a:t>
+              <a:t>27.04.2017</a:t>
             </a:fld>
             <a:endParaRPr lang="de-AT"/>
           </a:p>
@@ -4486,7 +4491,7 @@
           <a:p>
             <a:fld id="{944C4F3D-D207-4070-86C5-DABDE1FFC9F6}" type="datetimeFigureOut">
               <a:rPr lang="de-AT" smtClean="0"/>
-              <a:t>26.04.2017</a:t>
+              <a:t>27.04.2017</a:t>
             </a:fld>
             <a:endParaRPr lang="de-AT"/>
           </a:p>
@@ -4581,7 +4586,7 @@
           <a:p>
             <a:fld id="{944C4F3D-D207-4070-86C5-DABDE1FFC9F6}" type="datetimeFigureOut">
               <a:rPr lang="de-AT" smtClean="0"/>
-              <a:t>26.04.2017</a:t>
+              <a:t>27.04.2017</a:t>
             </a:fld>
             <a:endParaRPr lang="de-AT"/>
           </a:p>
@@ -4860,7 +4865,7 @@
           <a:p>
             <a:fld id="{944C4F3D-D207-4070-86C5-DABDE1FFC9F6}" type="datetimeFigureOut">
               <a:rPr lang="de-AT" smtClean="0"/>
-              <a:t>26.04.2017</a:t>
+              <a:t>27.04.2017</a:t>
             </a:fld>
             <a:endParaRPr lang="de-AT"/>
           </a:p>
@@ -5135,7 +5140,7 @@
           <a:p>
             <a:fld id="{944C4F3D-D207-4070-86C5-DABDE1FFC9F6}" type="datetimeFigureOut">
               <a:rPr lang="de-AT" smtClean="0"/>
-              <a:t>26.04.2017</a:t>
+              <a:t>27.04.2017</a:t>
             </a:fld>
             <a:endParaRPr lang="de-AT"/>
           </a:p>
@@ -5564,7 +5569,7 @@
           <a:p>
             <a:fld id="{944C4F3D-D207-4070-86C5-DABDE1FFC9F6}" type="datetimeFigureOut">
               <a:rPr lang="de-AT" smtClean="0"/>
-              <a:t>26.04.2017</a:t>
+              <a:t>27.04.2017</a:t>
             </a:fld>
             <a:endParaRPr lang="de-AT"/>
           </a:p>
@@ -6588,7 +6593,7 @@
       </p:sp>
       <p:pic>
         <p:nvPicPr>
-          <p:cNvPr id="4" name="Inhaltsplatzhalter 3"/>
+          <p:cNvPr id="5" name="Inhaltsplatzhalter 4"/>
           <p:cNvPicPr>
             <a:picLocks noGrp="1" noChangeAspect="1"/>
           </p:cNvPicPr>
@@ -6610,8 +6615,8 @@
         </p:blipFill>
         <p:spPr>
           <a:xfrm>
-            <a:off x="321362" y="2419350"/>
-            <a:ext cx="11624327" cy="3829049"/>
+            <a:off x="237140" y="2392070"/>
+            <a:ext cx="11635430" cy="3831699"/>
           </a:xfrm>
         </p:spPr>
       </p:pic>
@@ -6720,7 +6725,6 @@
               <a:rPr lang="de-AT" dirty="0"/>
               <a:t>Benutzerverwaltung</a:t>
             </a:r>
-            <a:endParaRPr lang="de-AT" dirty="0"/>
           </a:p>
         </p:txBody>
       </p:sp>

</xml_diff>